<commit_message>
Add image attribution, change font to Times New Roman
</commit_message>
<xml_diff>
--- a/units/4/lessons/1/resources/petascale-lesson-4.1-slides.pptx
+++ b/units/4/lessons/1/resources/petascale-lesson-4.1-slides.pptx
@@ -1110,7 +1110,7 @@
         </p:nvSpPr>
         <p:spPr>
           <a:xfrm>
-            <a:off x="381300" y="685800"/>
+            <a:off x="381000" y="685800"/>
             <a:ext cx="6096000" cy="3429000"/>
           </a:xfrm>
           <a:custGeom>
@@ -1173,73 +1173,7 @@
               </a:spcAft>
               <a:buNone/>
             </a:pPr>
-            <a:r>
-              <a:rPr lang="en"/>
-              <a:t>Image</a:t>
-            </a:r>
-            <a:r>
-              <a:rPr lang="en" sz="1200">
-                <a:solidFill>
-                  <a:schemeClr val="dk1"/>
-                </a:solidFill>
-                <a:latin typeface="Times New Roman"/>
-                <a:ea typeface="Times New Roman"/>
-                <a:cs typeface="Times New Roman"/>
-                <a:sym typeface="Times New Roman"/>
-              </a:rPr>
-              <a:t> by </a:t>
-            </a:r>
-            <a:r>
-              <a:rPr lang="en" sz="1200" u="sng">
-                <a:solidFill>
-                  <a:srgbClr val="1155CC"/>
-                </a:solidFill>
-                <a:latin typeface="Times New Roman"/>
-                <a:ea typeface="Times New Roman"/>
-                <a:cs typeface="Times New Roman"/>
-                <a:sym typeface="Times New Roman"/>
-                <a:hlinkClick r:id="rId3"/>
-              </a:rPr>
-              <a:t>Arnold Gatilao</a:t>
-            </a:r>
-            <a:r>
-              <a:rPr lang="en" sz="1200">
-                <a:solidFill>
-                  <a:schemeClr val="dk1"/>
-                </a:solidFill>
-                <a:latin typeface="Times New Roman"/>
-                <a:ea typeface="Times New Roman"/>
-                <a:cs typeface="Times New Roman"/>
-                <a:sym typeface="Times New Roman"/>
-              </a:rPr>
-              <a:t>, 2007, from </a:t>
-            </a:r>
-            <a:r>
-              <a:rPr lang="en" sz="1200" u="sng">
-                <a:solidFill>
-                  <a:srgbClr val="1155CC"/>
-                </a:solidFill>
-                <a:latin typeface="Times New Roman"/>
-                <a:ea typeface="Times New Roman"/>
-                <a:cs typeface="Times New Roman"/>
-                <a:sym typeface="Times New Roman"/>
-                <a:hlinkClick r:id="rId4"/>
-              </a:rPr>
-              <a:t>https://en.wikipedia.org/wiki/Opera_cake</a:t>
-            </a:r>
-            <a:r>
-              <a:rPr lang="en" sz="1200">
-                <a:solidFill>
-                  <a:schemeClr val="dk1"/>
-                </a:solidFill>
-                <a:latin typeface="Times New Roman"/>
-                <a:ea typeface="Times New Roman"/>
-                <a:cs typeface="Times New Roman"/>
-                <a:sym typeface="Times New Roman"/>
-              </a:rPr>
-              <a:t> and shared with a CC 2.0 license</a:t>
-            </a:r>
-            <a:endParaRPr/>
+            <a:endParaRPr dirty="0"/>
           </a:p>
         </p:txBody>
       </p:sp>
@@ -1592,7 +1526,7 @@
         </p:nvSpPr>
         <p:spPr>
           <a:xfrm>
-            <a:off x="381300" y="685800"/>
+            <a:off x="381000" y="685800"/>
             <a:ext cx="6096000" cy="3429000"/>
           </a:xfrm>
           <a:custGeom>
@@ -9153,10 +9087,10 @@
               <a:buChar char="●"/>
             </a:pPr>
             <a:r>
-              <a:rPr lang="en"/>
+              <a:rPr lang="en" dirty="0"/>
               <a:t>Chefs making many-layered opera cake</a:t>
             </a:r>
-            <a:endParaRPr/>
+            <a:endParaRPr dirty="0"/>
           </a:p>
           <a:p>
             <a:pPr marL="914400" lvl="1" indent="-317500" algn="l" rtl="0">
@@ -9173,10 +9107,10 @@
               <a:buChar char="○"/>
             </a:pPr>
             <a:r>
-              <a:rPr lang="en"/>
+              <a:rPr lang="en" dirty="0"/>
               <a:t>Layers can be made separately, but can’t all try to deposit on serving plate at once</a:t>
             </a:r>
-            <a:endParaRPr/>
+            <a:endParaRPr dirty="0"/>
           </a:p>
           <a:p>
             <a:pPr marL="914400" lvl="1" indent="-317500" algn="l" rtl="0">
@@ -9193,10 +9127,10 @@
               <a:buChar char="○"/>
             </a:pPr>
             <a:r>
-              <a:rPr lang="en"/>
+              <a:rPr lang="en" dirty="0"/>
               <a:t>Called a reduction: many contributions combined into one final product</a:t>
             </a:r>
-            <a:endParaRPr/>
+            <a:endParaRPr dirty="0"/>
           </a:p>
         </p:txBody>
       </p:sp>
@@ -9237,7 +9171,7 @@
         <p:spPr>
           <a:xfrm>
             <a:off x="6191025" y="4350550"/>
-            <a:ext cx="2265000" cy="251100"/>
+            <a:ext cx="2265000" cy="792950"/>
           </a:xfrm>
           <a:prstGeom prst="rect">
             <a:avLst/>
@@ -9263,10 +9197,69 @@
               <a:buNone/>
             </a:pPr>
             <a:r>
-              <a:rPr lang="en" sz="1000"/>
-              <a:t>Image: Arnold Gatilao, via Wikipedia</a:t>
-            </a:r>
-            <a:endParaRPr sz="1000"/>
+              <a:rPr lang="en" sz="1200" dirty="0">
+                <a:latin typeface="Times New Roman" charset="0"/>
+                <a:ea typeface="Times New Roman" charset="0"/>
+                <a:cs typeface="Times New Roman" charset="0"/>
+              </a:rPr>
+              <a:t>Image: </a:t>
+            </a:r>
+            <a:r>
+              <a:rPr lang="en-US" sz="1200" dirty="0" smtClean="0">
+                <a:latin typeface="Times New Roman" charset="0"/>
+                <a:ea typeface="Times New Roman" charset="0"/>
+                <a:cs typeface="Times New Roman" charset="0"/>
+                <a:hlinkClick r:id="rId4"/>
+              </a:rPr>
+              <a:t>Opera Cake</a:t>
+            </a:r>
+            <a:r>
+              <a:rPr lang="en-US" sz="1200" dirty="0" smtClean="0">
+                <a:latin typeface="Times New Roman" charset="0"/>
+                <a:ea typeface="Times New Roman" charset="0"/>
+                <a:cs typeface="Times New Roman" charset="0"/>
+              </a:rPr>
+              <a:t> by </a:t>
+            </a:r>
+            <a:r>
+              <a:rPr lang="en" sz="1200" dirty="0" smtClean="0">
+                <a:latin typeface="Times New Roman" charset="0"/>
+                <a:ea typeface="Times New Roman" charset="0"/>
+                <a:cs typeface="Times New Roman" charset="0"/>
+                <a:hlinkClick r:id="rId5"/>
+              </a:rPr>
+              <a:t>Arnold Gatilao</a:t>
+            </a:r>
+            <a:r>
+              <a:rPr lang="en-US" sz="1200" dirty="0">
+                <a:latin typeface="Times New Roman" charset="0"/>
+                <a:ea typeface="Times New Roman" charset="0"/>
+                <a:cs typeface="Times New Roman" charset="0"/>
+              </a:rPr>
+              <a:t> </a:t>
+            </a:r>
+            <a:r>
+              <a:rPr lang="en-US" sz="1200" dirty="0" smtClean="0">
+                <a:latin typeface="Times New Roman" charset="0"/>
+                <a:ea typeface="Times New Roman" charset="0"/>
+                <a:cs typeface="Times New Roman" charset="0"/>
+              </a:rPr>
+              <a:t>is licensed under </a:t>
+            </a:r>
+            <a:r>
+              <a:rPr lang="en-US" sz="1200" dirty="0" smtClean="0">
+                <a:latin typeface="Times New Roman" charset="0"/>
+                <a:ea typeface="Times New Roman" charset="0"/>
+                <a:cs typeface="Times New Roman" charset="0"/>
+                <a:hlinkClick r:id="rId6"/>
+              </a:rPr>
+              <a:t>CC BY 2.0</a:t>
+            </a:r>
+            <a:endParaRPr sz="1200" dirty="0">
+              <a:latin typeface="Times New Roman" charset="0"/>
+              <a:ea typeface="Times New Roman" charset="0"/>
+              <a:cs typeface="Times New Roman" charset="0"/>
+            </a:endParaRPr>
           </a:p>
         </p:txBody>
       </p:sp>
@@ -10435,44 +10428,6 @@
               <a:rPr lang="en"/>
               <a:t>Parallel output</a:t>
             </a:r>
-            <a:endParaRPr/>
-          </a:p>
-        </p:txBody>
-      </p:sp>
-      <p:sp>
-        <p:nvSpPr>
-          <p:cNvPr id="97" name="Google Shape;97;p19"/>
-          <p:cNvSpPr txBox="1">
-            <a:spLocks noGrp="1"/>
-          </p:cNvSpPr>
-          <p:nvPr>
-            <p:ph type="body" idx="1"/>
-          </p:nvPr>
-        </p:nvSpPr>
-        <p:spPr>
-          <a:xfrm>
-            <a:off x="311700" y="1152475"/>
-            <a:ext cx="5040000" cy="3416400"/>
-          </a:xfrm>
-          <a:prstGeom prst="rect">
-            <a:avLst/>
-          </a:prstGeom>
-        </p:spPr>
-        <p:txBody>
-          <a:bodyPr spcFirstLastPara="1" wrap="square" lIns="91425" tIns="91425" rIns="91425" bIns="91425" anchor="t" anchorCtr="0">
-            <a:noAutofit/>
-          </a:bodyPr>
-          <a:lstStyle/>
-          <a:p>
-            <a:pPr marL="0" lvl="0" indent="0" algn="l" rtl="0">
-              <a:spcBef>
-                <a:spcPts val="0"/>
-              </a:spcBef>
-              <a:spcAft>
-                <a:spcPts val="1600"/>
-              </a:spcAft>
-              <a:buNone/>
-            </a:pPr>
             <a:endParaRPr/>
           </a:p>
         </p:txBody>

</xml_diff>